<commit_message>
now searching and sorrting works
now searching and sorrting works---
change sql column name on movies table from category to category_id
</commit_message>
<xml_diff>
--- a/CrazyMovies.pptx
+++ b/CrazyMovies.pptx
@@ -14,7 +14,6 @@
     <p:sldId id="263" r:id="rId8"/>
     <p:sldId id="264" r:id="rId9"/>
     <p:sldId id="262" r:id="rId10"/>
-    <p:sldId id="265" r:id="rId11"/>
   </p:sldIdLst>
   <p:sldSz cx="12192000" cy="6858000"/>
   <p:notesSz cx="6858000" cy="9144000"/>
@@ -113,11 +112,6 @@
       </a:defRPr>
     </a:lvl9pPr>
   </p:defaultTextStyle>
-  <p:extLst>
-    <p:ext uri="{EFAFB233-063F-42B5-8137-9DF3F51BA10A}">
-      <p15:sldGuideLst xmlns:p15="http://schemas.microsoft.com/office/powerpoint/2012/main"/>
-    </p:ext>
-  </p:extLst>
 </p:presentation>
 </file>
 
@@ -3808,93 +3802,6 @@
 </p:sld>
 </file>
 
-<file path=ppt/slides/slide10.xml><?xml version="1.0" encoding="utf-8"?>
-<p:sld xmlns:a="http://schemas.openxmlformats.org/drawingml/2006/main" xmlns:r="http://schemas.openxmlformats.org/officeDocument/2006/relationships" xmlns:p="http://schemas.openxmlformats.org/presentationml/2006/main">
-  <p:cSld>
-    <p:spTree>
-      <p:nvGrpSpPr>
-        <p:cNvPr id="1" name=""/>
-        <p:cNvGrpSpPr/>
-        <p:nvPr/>
-      </p:nvGrpSpPr>
-      <p:grpSpPr>
-        <a:xfrm>
-          <a:off x="0" y="0"/>
-          <a:ext cx="0" cy="0"/>
-          <a:chOff x="0" y="0"/>
-          <a:chExt cx="0" cy="0"/>
-        </a:xfrm>
-      </p:grpSpPr>
-      <p:sp>
-        <p:nvSpPr>
-          <p:cNvPr id="2" name="Titre 1">
-            <a:extLst>
-              <a:ext uri="{FF2B5EF4-FFF2-40B4-BE49-F238E27FC236}">
-                <a16:creationId xmlns:a16="http://schemas.microsoft.com/office/drawing/2014/main" id="{CCBC482E-7FBE-4A42-86EF-8A3C3C6E6DAF}"/>
-              </a:ext>
-            </a:extLst>
-          </p:cNvPr>
-          <p:cNvSpPr>
-            <a:spLocks noGrp="1"/>
-          </p:cNvSpPr>
-          <p:nvPr>
-            <p:ph type="title"/>
-          </p:nvPr>
-        </p:nvSpPr>
-        <p:spPr/>
-        <p:txBody>
-          <a:bodyPr/>
-          <a:lstStyle/>
-          <a:p>
-            <a:r>
-              <a:rPr lang="fr-FR" dirty="0"/>
-              <a:t>LINK &amp; IDEA </a:t>
-            </a:r>
-            <a:endParaRPr lang="fr-LU" dirty="0"/>
-          </a:p>
-        </p:txBody>
-      </p:sp>
-      <p:sp>
-        <p:nvSpPr>
-          <p:cNvPr id="3" name="Espace réservé du contenu 2">
-            <a:extLst>
-              <a:ext uri="{FF2B5EF4-FFF2-40B4-BE49-F238E27FC236}">
-                <a16:creationId xmlns:a16="http://schemas.microsoft.com/office/drawing/2014/main" id="{41EC0763-88B6-4A47-A2E2-A8CAA17E5F08}"/>
-              </a:ext>
-            </a:extLst>
-          </p:cNvPr>
-          <p:cNvSpPr>
-            <a:spLocks noGrp="1"/>
-          </p:cNvSpPr>
-          <p:nvPr>
-            <p:ph idx="1"/>
-          </p:nvPr>
-        </p:nvSpPr>
-        <p:spPr/>
-        <p:txBody>
-          <a:bodyPr/>
-          <a:lstStyle/>
-          <a:p>
-            <a:r>
-              <a:rPr lang="fr-LU" dirty="0"/>
-              <a:t>https://tympanus.net/Development/RapidLayersAnimation/</a:t>
-            </a:r>
-          </a:p>
-        </p:txBody>
-      </p:sp>
-    </p:spTree>
-    <p:extLst>
-      <p:ext uri="{BB962C8B-B14F-4D97-AF65-F5344CB8AC3E}">
-        <p14:creationId xmlns:p14="http://schemas.microsoft.com/office/powerpoint/2010/main" val="650307384"/>
-      </p:ext>
-    </p:extLst>
-  </p:cSld>
-  <p:clrMapOvr>
-    <a:masterClrMapping/>
-  </p:clrMapOvr>
-</p:sld>
-</file>
-
 <file path=ppt/slides/slide2.xml><?xml version="1.0" encoding="utf-8"?>
 <p:sld xmlns:a="http://schemas.openxmlformats.org/drawingml/2006/main" xmlns:r="http://schemas.openxmlformats.org/officeDocument/2006/relationships" xmlns:p="http://schemas.openxmlformats.org/presentationml/2006/main">
   <p:cSld>

</xml_diff>